<commit_message>
úprava WBS a prezentace
</commit_message>
<xml_diff>
--- a/source/files/Hnat_Zakopal_TPR_prezentace_2.pptx
+++ b/source/files/Hnat_Zakopal_TPR_prezentace_2.pptx
@@ -15563,10 +15563,10 @@
       </p:sp>
       <p:pic>
         <p:nvPicPr>
-          <p:cNvPr id="15" name="Content Placeholder 14" descr="Text&#10;&#10;Description automatically generated">
+          <p:cNvPr id="14" name="Content Placeholder 13" descr="Shape&#10;&#10;Description automatically generated with low confidence">
             <a:extLst>
               <a:ext uri="{FF2B5EF4-FFF2-40B4-BE49-F238E27FC236}">
-                <a16:creationId xmlns:a16="http://schemas.microsoft.com/office/drawing/2014/main" id="{CC90659F-DAFD-3142-A733-EA5B1BBE0263}"/>
+                <a16:creationId xmlns:a16="http://schemas.microsoft.com/office/drawing/2014/main" id="{A9B73C93-E1F7-7548-A395-D670382EF868}"/>
               </a:ext>
             </a:extLst>
           </p:cNvPr>
@@ -15591,17 +15591,17 @@
         </p:blipFill>
         <p:spPr>
           <a:xfrm>
-            <a:off x="0" y="1276987"/>
-            <a:ext cx="3323304" cy="5329538"/>
+            <a:off x="25831" y="1509942"/>
+            <a:ext cx="3487923" cy="4972743"/>
           </a:xfrm>
         </p:spPr>
       </p:pic>
       <p:pic>
         <p:nvPicPr>
-          <p:cNvPr id="17" name="Picture 16" descr="Text&#10;&#10;Description automatically generated">
+          <p:cNvPr id="18" name="Picture 17" descr="Shape&#10;&#10;Description automatically generated with low confidence">
             <a:extLst>
               <a:ext uri="{FF2B5EF4-FFF2-40B4-BE49-F238E27FC236}">
-                <a16:creationId xmlns:a16="http://schemas.microsoft.com/office/drawing/2014/main" id="{12DC858C-FB5B-B243-B1FF-A086F04C652C}"/>
+                <a16:creationId xmlns:a16="http://schemas.microsoft.com/office/drawing/2014/main" id="{EC33C548-8445-D04D-AD00-C8401374ABE0}"/>
               </a:ext>
             </a:extLst>
           </p:cNvPr>
@@ -15624,8 +15624,8 @@
         </p:blipFill>
         <p:spPr>
           <a:xfrm>
-            <a:off x="3401962" y="1100053"/>
-            <a:ext cx="2774784" cy="5604131"/>
+            <a:off x="6283331" y="1509942"/>
+            <a:ext cx="2590668" cy="5142513"/>
           </a:xfrm>
           <a:prstGeom prst="rect">
             <a:avLst/>
@@ -15634,10 +15634,10 @@
       </p:pic>
       <p:pic>
         <p:nvPicPr>
-          <p:cNvPr id="19" name="Picture 18" descr="Text&#10;&#10;Description automatically generated">
+          <p:cNvPr id="21" name="Picture 20" descr="Shape&#10;&#10;Description automatically generated with low confidence">
             <a:extLst>
               <a:ext uri="{FF2B5EF4-FFF2-40B4-BE49-F238E27FC236}">
-                <a16:creationId xmlns:a16="http://schemas.microsoft.com/office/drawing/2014/main" id="{1542DAC9-3472-C544-8641-33E53922ABF2}"/>
+                <a16:creationId xmlns:a16="http://schemas.microsoft.com/office/drawing/2014/main" id="{5935D365-7E1C-2B43-8CF2-2E21EB22499A}"/>
               </a:ext>
             </a:extLst>
           </p:cNvPr>
@@ -15660,8 +15660,8 @@
         </p:blipFill>
         <p:spPr>
           <a:xfrm>
-            <a:off x="5991882" y="1100053"/>
-            <a:ext cx="2870595" cy="5524856"/>
+            <a:off x="3543467" y="1509941"/>
+            <a:ext cx="2739864" cy="5142513"/>
           </a:xfrm>
           <a:prstGeom prst="rect">
             <a:avLst/>

</xml_diff>